<commit_message>
refactor GameManager script, fix restart game bug
</commit_message>
<xml_diff>
--- a/art/LOGO.pptx
+++ b/art/LOGO.pptx
@@ -104,6 +104,11 @@
       </a:defRPr>
     </a:lvl9pPr>
   </p:defaultTextStyle>
+  <p:extLst>
+    <p:ext uri="{EFAFB233-063F-42B5-8137-9DF3F51BA10A}">
+      <p15:sldGuideLst xmlns:p15="http://schemas.microsoft.com/office/powerpoint/2012/main"/>
+    </p:ext>
+  </p:extLst>
 </p:presentation>
 </file>
 
@@ -256,7 +261,7 @@
           <a:p>
             <a:fld id="{24191A7E-2728-45C9-BF1A-3CA8E391AEBD}" type="datetimeFigureOut">
               <a:rPr lang="he-IL" smtClean="0"/>
-              <a:t>ב'/אדר ב/תשפ"ב</a:t>
+              <a:t>א'/ניסן/תשפ"ב</a:t>
             </a:fld>
             <a:endParaRPr lang="he-IL"/>
           </a:p>
@@ -456,7 +461,7 @@
           <a:p>
             <a:fld id="{24191A7E-2728-45C9-BF1A-3CA8E391AEBD}" type="datetimeFigureOut">
               <a:rPr lang="he-IL" smtClean="0"/>
-              <a:t>ב'/אדר ב/תשפ"ב</a:t>
+              <a:t>א'/ניסן/תשפ"ב</a:t>
             </a:fld>
             <a:endParaRPr lang="he-IL"/>
           </a:p>
@@ -666,7 +671,7 @@
           <a:p>
             <a:fld id="{24191A7E-2728-45C9-BF1A-3CA8E391AEBD}" type="datetimeFigureOut">
               <a:rPr lang="he-IL" smtClean="0"/>
-              <a:t>ב'/אדר ב/תשפ"ב</a:t>
+              <a:t>א'/ניסן/תשפ"ב</a:t>
             </a:fld>
             <a:endParaRPr lang="he-IL"/>
           </a:p>
@@ -866,7 +871,7 @@
           <a:p>
             <a:fld id="{24191A7E-2728-45C9-BF1A-3CA8E391AEBD}" type="datetimeFigureOut">
               <a:rPr lang="he-IL" smtClean="0"/>
-              <a:t>ב'/אדר ב/תשפ"ב</a:t>
+              <a:t>א'/ניסן/תשפ"ב</a:t>
             </a:fld>
             <a:endParaRPr lang="he-IL"/>
           </a:p>
@@ -1142,7 +1147,7 @@
           <a:p>
             <a:fld id="{24191A7E-2728-45C9-BF1A-3CA8E391AEBD}" type="datetimeFigureOut">
               <a:rPr lang="he-IL" smtClean="0"/>
-              <a:t>ב'/אדר ב/תשפ"ב</a:t>
+              <a:t>א'/ניסן/תשפ"ב</a:t>
             </a:fld>
             <a:endParaRPr lang="he-IL"/>
           </a:p>
@@ -1410,7 +1415,7 @@
           <a:p>
             <a:fld id="{24191A7E-2728-45C9-BF1A-3CA8E391AEBD}" type="datetimeFigureOut">
               <a:rPr lang="he-IL" smtClean="0"/>
-              <a:t>ב'/אדר ב/תשפ"ב</a:t>
+              <a:t>א'/ניסן/תשפ"ב</a:t>
             </a:fld>
             <a:endParaRPr lang="he-IL"/>
           </a:p>
@@ -1825,7 +1830,7 @@
           <a:p>
             <a:fld id="{24191A7E-2728-45C9-BF1A-3CA8E391AEBD}" type="datetimeFigureOut">
               <a:rPr lang="he-IL" smtClean="0"/>
-              <a:t>ב'/אדר ב/תשפ"ב</a:t>
+              <a:t>א'/ניסן/תשפ"ב</a:t>
             </a:fld>
             <a:endParaRPr lang="he-IL"/>
           </a:p>
@@ -1967,7 +1972,7 @@
           <a:p>
             <a:fld id="{24191A7E-2728-45C9-BF1A-3CA8E391AEBD}" type="datetimeFigureOut">
               <a:rPr lang="he-IL" smtClean="0"/>
-              <a:t>ב'/אדר ב/תשפ"ב</a:t>
+              <a:t>א'/ניסן/תשפ"ב</a:t>
             </a:fld>
             <a:endParaRPr lang="he-IL"/>
           </a:p>
@@ -2080,7 +2085,7 @@
           <a:p>
             <a:fld id="{24191A7E-2728-45C9-BF1A-3CA8E391AEBD}" type="datetimeFigureOut">
               <a:rPr lang="he-IL" smtClean="0"/>
-              <a:t>ב'/אדר ב/תשפ"ב</a:t>
+              <a:t>א'/ניסן/תשפ"ב</a:t>
             </a:fld>
             <a:endParaRPr lang="he-IL"/>
           </a:p>
@@ -2393,7 +2398,7 @@
           <a:p>
             <a:fld id="{24191A7E-2728-45C9-BF1A-3CA8E391AEBD}" type="datetimeFigureOut">
               <a:rPr lang="he-IL" smtClean="0"/>
-              <a:t>ב'/אדר ב/תשפ"ב</a:t>
+              <a:t>א'/ניסן/תשפ"ב</a:t>
             </a:fld>
             <a:endParaRPr lang="he-IL"/>
           </a:p>
@@ -2682,7 +2687,7 @@
           <a:p>
             <a:fld id="{24191A7E-2728-45C9-BF1A-3CA8E391AEBD}" type="datetimeFigureOut">
               <a:rPr lang="he-IL" smtClean="0"/>
-              <a:t>ב'/אדר ב/תשפ"ב</a:t>
+              <a:t>א'/ניסן/תשפ"ב</a:t>
             </a:fld>
             <a:endParaRPr lang="he-IL"/>
           </a:p>
@@ -2925,7 +2930,7 @@
           <a:p>
             <a:fld id="{24191A7E-2728-45C9-BF1A-3CA8E391AEBD}" type="datetimeFigureOut">
               <a:rPr lang="he-IL" smtClean="0"/>
-              <a:t>ב'/אדר ב/תשפ"ב</a:t>
+              <a:t>א'/ניסן/תשפ"ב</a:t>
             </a:fld>
             <a:endParaRPr lang="he-IL"/>
           </a:p>
@@ -3344,10 +3349,10 @@
       </p:grpSpPr>
       <p:sp>
         <p:nvSpPr>
-          <p:cNvPr id="4" name="Rectangle 3">
-            <a:extLst>
-              <a:ext uri="{FF2B5EF4-FFF2-40B4-BE49-F238E27FC236}">
-                <a16:creationId xmlns:a16="http://schemas.microsoft.com/office/drawing/2014/main" id="{FC5D8C1B-DC82-482F-95A9-410A74D7EE4D}"/>
+          <p:cNvPr id="2" name="Rectangle 1">
+            <a:extLst>
+              <a:ext uri="{FF2B5EF4-FFF2-40B4-BE49-F238E27FC236}">
+                <a16:creationId xmlns:a16="http://schemas.microsoft.com/office/drawing/2014/main" id="{4503980A-2F93-4823-BD20-DFE9C3299F2C}"/>
               </a:ext>
             </a:extLst>
           </p:cNvPr>
@@ -3356,19 +3361,68 @@
         </p:nvSpPr>
         <p:spPr>
           <a:xfrm>
-            <a:off x="0" y="0"/>
-            <a:ext cx="12192000" cy="6858000"/>
+            <a:off x="2652665" y="0"/>
+            <a:ext cx="6889687" cy="6858000"/>
           </a:xfrm>
           <a:prstGeom prst="rect">
+            <a:avLst/>
+          </a:prstGeom>
+          <a:solidFill>
+            <a:schemeClr val="accent1">
+              <a:lumMod val="75000"/>
+            </a:schemeClr>
+          </a:solidFill>
+        </p:spPr>
+        <p:style>
+          <a:lnRef idx="2">
+            <a:schemeClr val="accent1">
+              <a:shade val="50000"/>
+            </a:schemeClr>
+          </a:lnRef>
+          <a:fillRef idx="1">
+            <a:schemeClr val="accent1"/>
+          </a:fillRef>
+          <a:effectRef idx="0">
+            <a:schemeClr val="accent1"/>
+          </a:effectRef>
+          <a:fontRef idx="minor">
+            <a:schemeClr val="lt1"/>
+          </a:fontRef>
+        </p:style>
+        <p:txBody>
+          <a:bodyPr rtlCol="1" anchor="ctr"/>
+          <a:lstStyle/>
+          <a:p>
+            <a:pPr algn="ctr"/>
+            <a:endParaRPr lang="he-IL"/>
+          </a:p>
+        </p:txBody>
+      </p:sp>
+      <p:sp>
+        <p:nvSpPr>
+          <p:cNvPr id="6" name="Oval 5">
+            <a:extLst>
+              <a:ext uri="{FF2B5EF4-FFF2-40B4-BE49-F238E27FC236}">
+                <a16:creationId xmlns:a16="http://schemas.microsoft.com/office/drawing/2014/main" id="{4C4AF7EF-F613-4D34-87B6-C692AF82A240}"/>
+              </a:ext>
+            </a:extLst>
+          </p:cNvPr>
+          <p:cNvSpPr/>
+          <p:nvPr/>
+        </p:nvSpPr>
+        <p:spPr>
+          <a:xfrm>
+            <a:off x="2948411" y="273112"/>
+            <a:ext cx="6311775" cy="6311775"/>
+          </a:xfrm>
+          <a:prstGeom prst="ellipse">
             <a:avLst/>
           </a:prstGeom>
           <a:solidFill>
             <a:schemeClr val="bg1"/>
           </a:solidFill>
           <a:ln>
-            <a:solidFill>
-              <a:schemeClr val="bg1"/>
-            </a:solidFill>
+            <a:noFill/>
           </a:ln>
         </p:spPr>
         <p:style>
@@ -3392,15 +3446,65 @@
           <a:lstStyle/>
           <a:p>
             <a:pPr algn="ctr"/>
-            <a:r>
-              <a:rPr lang="en-US" sz="71400" dirty="0">
+            <a:endParaRPr lang="he-IL"/>
+          </a:p>
+        </p:txBody>
+      </p:sp>
+      <p:sp>
+        <p:nvSpPr>
+          <p:cNvPr id="4" name="Rectangle 3">
+            <a:extLst>
+              <a:ext uri="{FF2B5EF4-FFF2-40B4-BE49-F238E27FC236}">
+                <a16:creationId xmlns:a16="http://schemas.microsoft.com/office/drawing/2014/main" id="{FC5D8C1B-DC82-482F-95A9-410A74D7EE4D}"/>
+              </a:ext>
+            </a:extLst>
+          </p:cNvPr>
+          <p:cNvSpPr/>
+          <p:nvPr/>
+        </p:nvSpPr>
+        <p:spPr>
+          <a:xfrm>
+            <a:off x="3392787" y="841972"/>
+            <a:ext cx="3388259" cy="4802870"/>
+          </a:xfrm>
+          <a:prstGeom prst="rect">
+            <a:avLst/>
+          </a:prstGeom>
+          <a:noFill/>
+          <a:ln>
+            <a:noFill/>
+          </a:ln>
+        </p:spPr>
+        <p:style>
+          <a:lnRef idx="2">
+            <a:schemeClr val="accent1">
+              <a:shade val="50000"/>
+            </a:schemeClr>
+          </a:lnRef>
+          <a:fillRef idx="1">
+            <a:schemeClr val="accent1"/>
+          </a:fillRef>
+          <a:effectRef idx="0">
+            <a:schemeClr val="accent1"/>
+          </a:effectRef>
+          <a:fontRef idx="minor">
+            <a:schemeClr val="lt1"/>
+          </a:fontRef>
+        </p:style>
+        <p:txBody>
+          <a:bodyPr rtlCol="1" anchor="ctr"/>
+          <a:lstStyle/>
+          <a:p>
+            <a:pPr algn="ctr"/>
+            <a:r>
+              <a:rPr lang="en-US" sz="49600" dirty="0">
                 <a:ln>
                   <a:solidFill>
                     <a:sysClr val="windowText" lastClr="000000"/>
                   </a:solidFill>
                 </a:ln>
                 <a:solidFill>
-                  <a:srgbClr val="000099"/>
+                  <a:srgbClr val="0099FF"/>
                 </a:solidFill>
                 <a:latin typeface="Algerian" panose="04020705040A02060702" pitchFamily="82" charset="0"/>
               </a:rPr>
@@ -3413,7 +3517,7 @@
                 </a:solidFill>
               </a:ln>
               <a:solidFill>
-                <a:srgbClr val="000099"/>
+                <a:srgbClr val="0099FF"/>
               </a:solidFill>
               <a:latin typeface="Algerian" panose="04020705040A02060702" pitchFamily="82" charset="0"/>
             </a:endParaRPr>
@@ -3469,6 +3573,154 @@
           <a:p>
             <a:pPr algn="ctr"/>
             <a:endParaRPr lang="he-IL"/>
+          </a:p>
+        </p:txBody>
+      </p:sp>
+      <p:sp>
+        <p:nvSpPr>
+          <p:cNvPr id="7" name="Rectangle 6">
+            <a:extLst>
+              <a:ext uri="{FF2B5EF4-FFF2-40B4-BE49-F238E27FC236}">
+                <a16:creationId xmlns:a16="http://schemas.microsoft.com/office/drawing/2014/main" id="{F850B3C6-363B-420E-910A-83A3B24E0955}"/>
+              </a:ext>
+            </a:extLst>
+          </p:cNvPr>
+          <p:cNvSpPr/>
+          <p:nvPr/>
+        </p:nvSpPr>
+        <p:spPr>
+          <a:xfrm>
+            <a:off x="5416235" y="1885376"/>
+            <a:ext cx="2267138" cy="3081202"/>
+          </a:xfrm>
+          <a:prstGeom prst="rect">
+            <a:avLst/>
+          </a:prstGeom>
+          <a:noFill/>
+          <a:ln>
+            <a:noFill/>
+          </a:ln>
+        </p:spPr>
+        <p:style>
+          <a:lnRef idx="2">
+            <a:schemeClr val="accent1">
+              <a:shade val="50000"/>
+            </a:schemeClr>
+          </a:lnRef>
+          <a:fillRef idx="1">
+            <a:schemeClr val="accent1"/>
+          </a:fillRef>
+          <a:effectRef idx="0">
+            <a:schemeClr val="accent1"/>
+          </a:effectRef>
+          <a:fontRef idx="minor">
+            <a:schemeClr val="lt1"/>
+          </a:fontRef>
+        </p:style>
+        <p:txBody>
+          <a:bodyPr rtlCol="1" anchor="ctr"/>
+          <a:lstStyle/>
+          <a:p>
+            <a:pPr algn="ctr"/>
+            <a:r>
+              <a:rPr lang="en-US" sz="28700" dirty="0">
+                <a:ln>
+                  <a:solidFill>
+                    <a:sysClr val="windowText" lastClr="000000"/>
+                  </a:solidFill>
+                </a:ln>
+                <a:solidFill>
+                  <a:srgbClr val="0099FF"/>
+                </a:solidFill>
+                <a:latin typeface="Algerian" panose="04020705040A02060702" pitchFamily="82" charset="0"/>
+              </a:rPr>
+              <a:t>2</a:t>
+            </a:r>
+            <a:endParaRPr lang="he-IL" sz="16600" dirty="0">
+              <a:ln>
+                <a:solidFill>
+                  <a:sysClr val="windowText" lastClr="000000"/>
+                </a:solidFill>
+              </a:ln>
+              <a:solidFill>
+                <a:srgbClr val="0099FF"/>
+              </a:solidFill>
+              <a:latin typeface="Algerian" panose="04020705040A02060702" pitchFamily="82" charset="0"/>
+            </a:endParaRPr>
+          </a:p>
+        </p:txBody>
+      </p:sp>
+      <p:sp>
+        <p:nvSpPr>
+          <p:cNvPr id="8" name="Rectangle 7">
+            <a:extLst>
+              <a:ext uri="{FF2B5EF4-FFF2-40B4-BE49-F238E27FC236}">
+                <a16:creationId xmlns:a16="http://schemas.microsoft.com/office/drawing/2014/main" id="{0E7A6062-76EC-41FA-93B7-94E2F246529A}"/>
+              </a:ext>
+            </a:extLst>
+          </p:cNvPr>
+          <p:cNvSpPr/>
+          <p:nvPr/>
+        </p:nvSpPr>
+        <p:spPr>
+          <a:xfrm>
+            <a:off x="7332174" y="2038164"/>
+            <a:ext cx="1423658" cy="2122281"/>
+          </a:xfrm>
+          <a:prstGeom prst="rect">
+            <a:avLst/>
+          </a:prstGeom>
+          <a:noFill/>
+          <a:ln>
+            <a:noFill/>
+          </a:ln>
+        </p:spPr>
+        <p:style>
+          <a:lnRef idx="2">
+            <a:schemeClr val="accent1">
+              <a:shade val="50000"/>
+            </a:schemeClr>
+          </a:lnRef>
+          <a:fillRef idx="1">
+            <a:schemeClr val="accent1"/>
+          </a:fillRef>
+          <a:effectRef idx="0">
+            <a:schemeClr val="accent1"/>
+          </a:effectRef>
+          <a:fontRef idx="minor">
+            <a:schemeClr val="lt1"/>
+          </a:fontRef>
+        </p:style>
+        <p:txBody>
+          <a:bodyPr rtlCol="1" anchor="ctr"/>
+          <a:lstStyle/>
+          <a:p>
+            <a:pPr algn="ctr"/>
+            <a:r>
+              <a:rPr lang="en-US" sz="19900" dirty="0">
+                <a:ln>
+                  <a:solidFill>
+                    <a:sysClr val="windowText" lastClr="000000"/>
+                  </a:solidFill>
+                </a:ln>
+                <a:solidFill>
+                  <a:srgbClr val="0099FF"/>
+                </a:solidFill>
+                <a:latin typeface="Algerian" panose="04020705040A02060702" pitchFamily="82" charset="0"/>
+              </a:rPr>
+              <a:t>3</a:t>
+            </a:r>
+            <a:endParaRPr lang="he-IL" sz="11500" dirty="0">
+              <a:ln>
+                <a:solidFill>
+                  <a:sysClr val="windowText" lastClr="000000"/>
+                </a:solidFill>
+              </a:ln>
+              <a:solidFill>
+                <a:srgbClr val="0099FF"/>
+              </a:solidFill>
+              <a:latin typeface="Algerian" panose="04020705040A02060702" pitchFamily="82" charset="0"/>
+            </a:endParaRPr>
           </a:p>
         </p:txBody>
       </p:sp>

</xml_diff>